<commit_message>
Working music views with overlays
</commit_message>
<xml_diff>
--- a/Templates Font.pptx
+++ b/Templates Font.pptx
@@ -104,6 +104,11 @@
       </a:defRPr>
     </a:lvl9pPr>
   </p:defaultTextStyle>
+  <p:extLst>
+    <p:ext uri="{EFAFB233-063F-42B5-8137-9DF3F51BA10A}">
+      <p15:sldGuideLst xmlns:p15="http://schemas.microsoft.com/office/powerpoint/2012/main"/>
+    </p:ext>
+  </p:extLst>
 </p:presentation>
 </file>
 
@@ -238,7 +243,7 @@
           <a:p>
             <a:fld id="{16A10917-2F28-423F-A7B5-87DB944FC86F}" type="datetimeFigureOut">
               <a:rPr lang="de-DE" smtClean="0"/>
-              <a:t>17.06.2013</a:t>
+              <a:t>21.06.2013</a:t>
             </a:fld>
             <a:endParaRPr lang="de-DE"/>
           </a:p>
@@ -408,7 +413,7 @@
           <a:p>
             <a:fld id="{16A10917-2F28-423F-A7B5-87DB944FC86F}" type="datetimeFigureOut">
               <a:rPr lang="de-DE" smtClean="0"/>
-              <a:t>17.06.2013</a:t>
+              <a:t>21.06.2013</a:t>
             </a:fld>
             <a:endParaRPr lang="de-DE"/>
           </a:p>
@@ -588,7 +593,7 @@
           <a:p>
             <a:fld id="{16A10917-2F28-423F-A7B5-87DB944FC86F}" type="datetimeFigureOut">
               <a:rPr lang="de-DE" smtClean="0"/>
-              <a:t>17.06.2013</a:t>
+              <a:t>21.06.2013</a:t>
             </a:fld>
             <a:endParaRPr lang="de-DE"/>
           </a:p>
@@ -758,7 +763,7 @@
           <a:p>
             <a:fld id="{16A10917-2F28-423F-A7B5-87DB944FC86F}" type="datetimeFigureOut">
               <a:rPr lang="de-DE" smtClean="0"/>
-              <a:t>17.06.2013</a:t>
+              <a:t>21.06.2013</a:t>
             </a:fld>
             <a:endParaRPr lang="de-DE"/>
           </a:p>
@@ -1004,7 +1009,7 @@
           <a:p>
             <a:fld id="{16A10917-2F28-423F-A7B5-87DB944FC86F}" type="datetimeFigureOut">
               <a:rPr lang="de-DE" smtClean="0"/>
-              <a:t>17.06.2013</a:t>
+              <a:t>21.06.2013</a:t>
             </a:fld>
             <a:endParaRPr lang="de-DE"/>
           </a:p>
@@ -1236,7 +1241,7 @@
           <a:p>
             <a:fld id="{16A10917-2F28-423F-A7B5-87DB944FC86F}" type="datetimeFigureOut">
               <a:rPr lang="de-DE" smtClean="0"/>
-              <a:t>17.06.2013</a:t>
+              <a:t>21.06.2013</a:t>
             </a:fld>
             <a:endParaRPr lang="de-DE"/>
           </a:p>
@@ -1603,7 +1608,7 @@
           <a:p>
             <a:fld id="{16A10917-2F28-423F-A7B5-87DB944FC86F}" type="datetimeFigureOut">
               <a:rPr lang="de-DE" smtClean="0"/>
-              <a:t>17.06.2013</a:t>
+              <a:t>21.06.2013</a:t>
             </a:fld>
             <a:endParaRPr lang="de-DE"/>
           </a:p>
@@ -1721,7 +1726,7 @@
           <a:p>
             <a:fld id="{16A10917-2F28-423F-A7B5-87DB944FC86F}" type="datetimeFigureOut">
               <a:rPr lang="de-DE" smtClean="0"/>
-              <a:t>17.06.2013</a:t>
+              <a:t>21.06.2013</a:t>
             </a:fld>
             <a:endParaRPr lang="de-DE"/>
           </a:p>
@@ -1816,7 +1821,7 @@
           <a:p>
             <a:fld id="{16A10917-2F28-423F-A7B5-87DB944FC86F}" type="datetimeFigureOut">
               <a:rPr lang="de-DE" smtClean="0"/>
-              <a:t>17.06.2013</a:t>
+              <a:t>21.06.2013</a:t>
             </a:fld>
             <a:endParaRPr lang="de-DE"/>
           </a:p>
@@ -2093,7 +2098,7 @@
           <a:p>
             <a:fld id="{16A10917-2F28-423F-A7B5-87DB944FC86F}" type="datetimeFigureOut">
               <a:rPr lang="de-DE" smtClean="0"/>
-              <a:t>17.06.2013</a:t>
+              <a:t>21.06.2013</a:t>
             </a:fld>
             <a:endParaRPr lang="de-DE"/>
           </a:p>
@@ -2346,7 +2351,7 @@
           <a:p>
             <a:fld id="{16A10917-2F28-423F-A7B5-87DB944FC86F}" type="datetimeFigureOut">
               <a:rPr lang="de-DE" smtClean="0"/>
-              <a:t>17.06.2013</a:t>
+              <a:t>21.06.2013</a:t>
             </a:fld>
             <a:endParaRPr lang="de-DE"/>
           </a:p>
@@ -2559,7 +2564,7 @@
           <a:p>
             <a:fld id="{16A10917-2F28-423F-A7B5-87DB944FC86F}" type="datetimeFigureOut">
               <a:rPr lang="de-DE" smtClean="0"/>
-              <a:t>17.06.2013</a:t>
+              <a:t>21.06.2013</a:t>
             </a:fld>
             <a:endParaRPr lang="de-DE"/>
           </a:p>
@@ -2973,7 +2978,7 @@
         <p:spPr>
           <a:xfrm>
             <a:off x="2558143" y="2416629"/>
-            <a:ext cx="5020926" cy="1200329"/>
+            <a:ext cx="5020926" cy="1754326"/>
           </a:xfrm>
           <a:prstGeom prst="rect">
             <a:avLst/>
@@ -3009,8 +3014,12 @@
                 <a:latin typeface="Segoe UI Symbol" panose="020B0502040204020203" pitchFamily="34" charset="0"/>
                 <a:ea typeface="Segoe UI Symbol" panose="020B0502040204020203" pitchFamily="34" charset="0"/>
               </a:rPr>
-              <a:t></a:t>
-            </a:r>
+              <a:t></a:t>
+            </a:r>
+            <a:endParaRPr lang="de-DE" dirty="0" smtClean="0">
+              <a:latin typeface="Segoe UI Symbol" panose="020B0502040204020203" pitchFamily="34" charset="0"/>
+              <a:ea typeface="Segoe UI Symbol" panose="020B0502040204020203" pitchFamily="34" charset="0"/>
+            </a:endParaRPr>
           </a:p>
           <a:p>
             <a:r>
@@ -3018,9 +3027,77 @@
                 <a:latin typeface="Segoe UI Symbol" panose="020B0502040204020203" pitchFamily="34" charset="0"/>
                 <a:ea typeface="Segoe UI Symbol" panose="020B0502040204020203" pitchFamily="34" charset="0"/>
               </a:rPr>
-              <a:t>🎶🎼🎬🎮🏈📺📻📷🔇🔈🔉🔊</a:t>
-            </a:r>
+              <a:t>🎶🎼🎬🎮🏈📺📻📷🔇🔈🔉🔊</a:t>
+            </a:r>
+            <a:r>
+              <a:rPr lang="de-DE" dirty="0" smtClean="0">
+                <a:latin typeface="Segoe UI Symbol" panose="020B0502040204020203" pitchFamily="34" charset="0"/>
+                <a:ea typeface="Segoe UI Symbol" panose="020B0502040204020203" pitchFamily="34" charset="0"/>
+              </a:rPr>
+              <a:t></a:t>
+            </a:r>
+          </a:p>
+          <a:p>
+            <a:endParaRPr lang="de-DE" dirty="0">
+              <a:latin typeface="Segoe UI Symbol" panose="020B0502040204020203" pitchFamily="34" charset="0"/>
+              <a:ea typeface="Segoe UI Symbol" panose="020B0502040204020203" pitchFamily="34" charset="0"/>
+            </a:endParaRPr>
+          </a:p>
+          <a:p>
             <a:endParaRPr lang="de-DE" dirty="0"/>
+          </a:p>
+        </p:txBody>
+      </p:sp>
+      <p:sp>
+        <p:nvSpPr>
+          <p:cNvPr id="2" name="Textfeld 1"/>
+          <p:cNvSpPr txBox="1"/>
+          <p:nvPr/>
+        </p:nvSpPr>
+        <p:spPr>
+          <a:xfrm>
+            <a:off x="2891790" y="4857750"/>
+            <a:ext cx="2005870" cy="1863090"/>
+          </a:xfrm>
+          <a:prstGeom prst="rect">
+            <a:avLst/>
+          </a:prstGeom>
+          <a:noFill/>
+        </p:spPr>
+        <p:txBody>
+          <a:bodyPr wrap="none" rtlCol="0">
+            <a:prstTxWarp prst="textArchUp">
+              <a:avLst>
+                <a:gd name="adj" fmla="val 12816686"/>
+              </a:avLst>
+            </a:prstTxWarp>
+            <a:spAutoFit/>
+          </a:bodyPr>
+          <a:lstStyle/>
+          <a:p>
+            <a:r>
+              <a:rPr lang="en-GB" sz="2400" dirty="0" smtClean="0">
+                <a:solidFill>
+                  <a:schemeClr val="tx1">
+                    <a:lumMod val="65000"/>
+                    <a:lumOff val="35000"/>
+                  </a:schemeClr>
+                </a:solidFill>
+                <a:latin typeface="Times New Roman" panose="02020603050405020304" pitchFamily="18" charset="0"/>
+                <a:cs typeface="Times New Roman" panose="02020603050405020304" pitchFamily="18" charset="0"/>
+              </a:rPr>
+              <a:t>Various Artists</a:t>
+            </a:r>
+            <a:endParaRPr lang="de-DE" sz="2400" dirty="0">
+              <a:solidFill>
+                <a:schemeClr val="tx1">
+                  <a:lumMod val="65000"/>
+                  <a:lumOff val="35000"/>
+                </a:schemeClr>
+              </a:solidFill>
+              <a:latin typeface="Times New Roman" panose="02020603050405020304" pitchFamily="18" charset="0"/>
+              <a:cs typeface="Times New Roman" panose="02020603050405020304" pitchFamily="18" charset="0"/>
+            </a:endParaRPr>
           </a:p>
         </p:txBody>
       </p:sp>

</xml_diff>

<commit_message>
Working Music & Picture Module
+ first steps on my Video
Still open: fanart, latest music/pic overlays (do not work yet)
</commit_message>
<xml_diff>
--- a/Templates Font.pptx
+++ b/Templates Font.pptx
@@ -243,7 +243,7 @@
           <a:p>
             <a:fld id="{16A10917-2F28-423F-A7B5-87DB944FC86F}" type="datetimeFigureOut">
               <a:rPr lang="de-DE" smtClean="0"/>
-              <a:t>21.06.2013</a:t>
+              <a:t>06.07.2013</a:t>
             </a:fld>
             <a:endParaRPr lang="de-DE"/>
           </a:p>
@@ -413,7 +413,7 @@
           <a:p>
             <a:fld id="{16A10917-2F28-423F-A7B5-87DB944FC86F}" type="datetimeFigureOut">
               <a:rPr lang="de-DE" smtClean="0"/>
-              <a:t>21.06.2013</a:t>
+              <a:t>06.07.2013</a:t>
             </a:fld>
             <a:endParaRPr lang="de-DE"/>
           </a:p>
@@ -593,7 +593,7 @@
           <a:p>
             <a:fld id="{16A10917-2F28-423F-A7B5-87DB944FC86F}" type="datetimeFigureOut">
               <a:rPr lang="de-DE" smtClean="0"/>
-              <a:t>21.06.2013</a:t>
+              <a:t>06.07.2013</a:t>
             </a:fld>
             <a:endParaRPr lang="de-DE"/>
           </a:p>
@@ -763,7 +763,7 @@
           <a:p>
             <a:fld id="{16A10917-2F28-423F-A7B5-87DB944FC86F}" type="datetimeFigureOut">
               <a:rPr lang="de-DE" smtClean="0"/>
-              <a:t>21.06.2013</a:t>
+              <a:t>06.07.2013</a:t>
             </a:fld>
             <a:endParaRPr lang="de-DE"/>
           </a:p>
@@ -1009,7 +1009,7 @@
           <a:p>
             <a:fld id="{16A10917-2F28-423F-A7B5-87DB944FC86F}" type="datetimeFigureOut">
               <a:rPr lang="de-DE" smtClean="0"/>
-              <a:t>21.06.2013</a:t>
+              <a:t>06.07.2013</a:t>
             </a:fld>
             <a:endParaRPr lang="de-DE"/>
           </a:p>
@@ -1241,7 +1241,7 @@
           <a:p>
             <a:fld id="{16A10917-2F28-423F-A7B5-87DB944FC86F}" type="datetimeFigureOut">
               <a:rPr lang="de-DE" smtClean="0"/>
-              <a:t>21.06.2013</a:t>
+              <a:t>06.07.2013</a:t>
             </a:fld>
             <a:endParaRPr lang="de-DE"/>
           </a:p>
@@ -1608,7 +1608,7 @@
           <a:p>
             <a:fld id="{16A10917-2F28-423F-A7B5-87DB944FC86F}" type="datetimeFigureOut">
               <a:rPr lang="de-DE" smtClean="0"/>
-              <a:t>21.06.2013</a:t>
+              <a:t>06.07.2013</a:t>
             </a:fld>
             <a:endParaRPr lang="de-DE"/>
           </a:p>
@@ -1726,7 +1726,7 @@
           <a:p>
             <a:fld id="{16A10917-2F28-423F-A7B5-87DB944FC86F}" type="datetimeFigureOut">
               <a:rPr lang="de-DE" smtClean="0"/>
-              <a:t>21.06.2013</a:t>
+              <a:t>06.07.2013</a:t>
             </a:fld>
             <a:endParaRPr lang="de-DE"/>
           </a:p>
@@ -1821,7 +1821,7 @@
           <a:p>
             <a:fld id="{16A10917-2F28-423F-A7B5-87DB944FC86F}" type="datetimeFigureOut">
               <a:rPr lang="de-DE" smtClean="0"/>
-              <a:t>21.06.2013</a:t>
+              <a:t>06.07.2013</a:t>
             </a:fld>
             <a:endParaRPr lang="de-DE"/>
           </a:p>
@@ -2098,7 +2098,7 @@
           <a:p>
             <a:fld id="{16A10917-2F28-423F-A7B5-87DB944FC86F}" type="datetimeFigureOut">
               <a:rPr lang="de-DE" smtClean="0"/>
-              <a:t>21.06.2013</a:t>
+              <a:t>06.07.2013</a:t>
             </a:fld>
             <a:endParaRPr lang="de-DE"/>
           </a:p>
@@ -2351,7 +2351,7 @@
           <a:p>
             <a:fld id="{16A10917-2F28-423F-A7B5-87DB944FC86F}" type="datetimeFigureOut">
               <a:rPr lang="de-DE" smtClean="0"/>
-              <a:t>21.06.2013</a:t>
+              <a:t>06.07.2013</a:t>
             </a:fld>
             <a:endParaRPr lang="de-DE"/>
           </a:p>
@@ -2564,7 +2564,7 @@
           <a:p>
             <a:fld id="{16A10917-2F28-423F-A7B5-87DB944FC86F}" type="datetimeFigureOut">
               <a:rPr lang="de-DE" smtClean="0"/>
-              <a:t>21.06.2013</a:t>
+              <a:t>06.07.2013</a:t>
             </a:fld>
             <a:endParaRPr lang="de-DE"/>
           </a:p>
@@ -3001,12 +3001,23 @@
           </a:p>
           <a:p>
             <a:r>
+              <a:rPr lang="de-DE" dirty="0">
+                <a:latin typeface="Segoe UI Symbol" panose="020B0502040204020203" pitchFamily="34" charset="0"/>
+                <a:ea typeface="Segoe UI Symbol" panose="020B0502040204020203" pitchFamily="34" charset="0"/>
+              </a:rPr>
+              <a:t>▷ </a:t>
+            </a:r>
+            <a:r>
               <a:rPr lang="de-DE" dirty="0" smtClean="0">
                 <a:latin typeface="Segoe UI Symbol" panose="020B0502040204020203" pitchFamily="34" charset="0"/>
                 <a:ea typeface="Segoe UI Symbol" panose="020B0502040204020203" pitchFamily="34" charset="0"/>
               </a:rPr>
-              <a:t></a:t>
-            </a:r>
+              <a:t>💿</a:t>
+            </a:r>
+            <a:endParaRPr lang="de-DE" dirty="0" smtClean="0">
+              <a:latin typeface="Segoe UI Symbol" panose="020B0502040204020203" pitchFamily="34" charset="0"/>
+              <a:ea typeface="Segoe UI Symbol" panose="020B0502040204020203" pitchFamily="34" charset="0"/>
+            </a:endParaRPr>
           </a:p>
           <a:p>
             <a:r>
@@ -3014,7 +3025,7 @@
                 <a:latin typeface="Segoe UI Symbol" panose="020B0502040204020203" pitchFamily="34" charset="0"/>
                 <a:ea typeface="Segoe UI Symbol" panose="020B0502040204020203" pitchFamily="34" charset="0"/>
               </a:rPr>
-              <a:t></a:t>
+              <a:t>❌⏏</a:t>
             </a:r>
             <a:endParaRPr lang="de-DE" dirty="0" smtClean="0">
               <a:latin typeface="Segoe UI Symbol" panose="020B0502040204020203" pitchFamily="34" charset="0"/>
@@ -3038,12 +3049,19 @@
             </a:r>
           </a:p>
           <a:p>
-            <a:endParaRPr lang="de-DE" dirty="0">
+            <a:endParaRPr lang="en-GB" dirty="0">
               <a:latin typeface="Segoe UI Symbol" panose="020B0502040204020203" pitchFamily="34" charset="0"/>
               <a:ea typeface="Segoe UI Symbol" panose="020B0502040204020203" pitchFamily="34" charset="0"/>
             </a:endParaRPr>
           </a:p>
           <a:p>
+            <a:r>
+              <a:rPr lang="de-DE" dirty="0" smtClean="0">
+                <a:latin typeface="Segoe UI Symbol" panose="020B0502040204020203" pitchFamily="34" charset="0"/>
+                <a:ea typeface="Segoe UI Symbol" panose="020B0502040204020203" pitchFamily="34" charset="0"/>
+              </a:rPr>
+              <a:t></a:t>
+            </a:r>
             <a:endParaRPr lang="de-DE" dirty="0"/>
           </a:p>
         </p:txBody>

</xml_diff>